<commit_message>
new cell type specificity analysis
</commit_message>
<xml_diff>
--- a/AD OLINK Update.pptx
+++ b/AD OLINK Update.pptx
@@ -218,7 +218,7 @@
           <a:p>
             <a:fld id="{9D797066-FD97-4FDD-84AA-3CF4218989F4}" type="datetimeFigureOut">
               <a:rPr lang="en-US" smtClean="0"/>
-              <a:t>12/15/2023</a:t>
+              <a:t>1/3/2024</a:t>
             </a:fld>
             <a:endParaRPr lang="en-US"/>
           </a:p>
@@ -1957,7 +1957,7 @@
           <a:p>
             <a:fld id="{52098A3C-E06F-45ED-B0BE-58C299898780}" type="datetimeFigureOut">
               <a:rPr lang="en-US" smtClean="0"/>
-              <a:t>12/15/2023</a:t>
+              <a:t>1/3/2024</a:t>
             </a:fld>
             <a:endParaRPr lang="en-US"/>
           </a:p>
@@ -2155,7 +2155,7 @@
           <a:p>
             <a:fld id="{52098A3C-E06F-45ED-B0BE-58C299898780}" type="datetimeFigureOut">
               <a:rPr lang="en-US" smtClean="0"/>
-              <a:t>12/15/2023</a:t>
+              <a:t>1/3/2024</a:t>
             </a:fld>
             <a:endParaRPr lang="en-US"/>
           </a:p>
@@ -2363,7 +2363,7 @@
           <a:p>
             <a:fld id="{52098A3C-E06F-45ED-B0BE-58C299898780}" type="datetimeFigureOut">
               <a:rPr lang="en-US" smtClean="0"/>
-              <a:t>12/15/2023</a:t>
+              <a:t>1/3/2024</a:t>
             </a:fld>
             <a:endParaRPr lang="en-US"/>
           </a:p>
@@ -2561,7 +2561,7 @@
           <a:p>
             <a:fld id="{52098A3C-E06F-45ED-B0BE-58C299898780}" type="datetimeFigureOut">
               <a:rPr lang="en-US" smtClean="0"/>
-              <a:t>12/15/2023</a:t>
+              <a:t>1/3/2024</a:t>
             </a:fld>
             <a:endParaRPr lang="en-US"/>
           </a:p>
@@ -2836,7 +2836,7 @@
           <a:p>
             <a:fld id="{52098A3C-E06F-45ED-B0BE-58C299898780}" type="datetimeFigureOut">
               <a:rPr lang="en-US" smtClean="0"/>
-              <a:t>12/15/2023</a:t>
+              <a:t>1/3/2024</a:t>
             </a:fld>
             <a:endParaRPr lang="en-US"/>
           </a:p>
@@ -3101,7 +3101,7 @@
           <a:p>
             <a:fld id="{52098A3C-E06F-45ED-B0BE-58C299898780}" type="datetimeFigureOut">
               <a:rPr lang="en-US" smtClean="0"/>
-              <a:t>12/15/2023</a:t>
+              <a:t>1/3/2024</a:t>
             </a:fld>
             <a:endParaRPr lang="en-US"/>
           </a:p>
@@ -3513,7 +3513,7 @@
           <a:p>
             <a:fld id="{52098A3C-E06F-45ED-B0BE-58C299898780}" type="datetimeFigureOut">
               <a:rPr lang="en-US" smtClean="0"/>
-              <a:t>12/15/2023</a:t>
+              <a:t>1/3/2024</a:t>
             </a:fld>
             <a:endParaRPr lang="en-US"/>
           </a:p>
@@ -3654,7 +3654,7 @@
           <a:p>
             <a:fld id="{52098A3C-E06F-45ED-B0BE-58C299898780}" type="datetimeFigureOut">
               <a:rPr lang="en-US" smtClean="0"/>
-              <a:t>12/15/2023</a:t>
+              <a:t>1/3/2024</a:t>
             </a:fld>
             <a:endParaRPr lang="en-US"/>
           </a:p>
@@ -3767,7 +3767,7 @@
           <a:p>
             <a:fld id="{52098A3C-E06F-45ED-B0BE-58C299898780}" type="datetimeFigureOut">
               <a:rPr lang="en-US" smtClean="0"/>
-              <a:t>12/15/2023</a:t>
+              <a:t>1/3/2024</a:t>
             </a:fld>
             <a:endParaRPr lang="en-US"/>
           </a:p>
@@ -4078,7 +4078,7 @@
           <a:p>
             <a:fld id="{52098A3C-E06F-45ED-B0BE-58C299898780}" type="datetimeFigureOut">
               <a:rPr lang="en-US" smtClean="0"/>
-              <a:t>12/15/2023</a:t>
+              <a:t>1/3/2024</a:t>
             </a:fld>
             <a:endParaRPr lang="en-US"/>
           </a:p>
@@ -4366,7 +4366,7 @@
           <a:p>
             <a:fld id="{52098A3C-E06F-45ED-B0BE-58C299898780}" type="datetimeFigureOut">
               <a:rPr lang="en-US" smtClean="0"/>
-              <a:t>12/15/2023</a:t>
+              <a:t>1/3/2024</a:t>
             </a:fld>
             <a:endParaRPr lang="en-US"/>
           </a:p>
@@ -4607,7 +4607,7 @@
           <a:p>
             <a:fld id="{52098A3C-E06F-45ED-B0BE-58C299898780}" type="datetimeFigureOut">
               <a:rPr lang="en-US" smtClean="0"/>
-              <a:t>12/15/2023</a:t>
+              <a:t>1/3/2024</a:t>
             </a:fld>
             <a:endParaRPr lang="en-US"/>
           </a:p>
@@ -5204,7 +5204,7 @@
           <a:graphicData uri="http://schemas.openxmlformats.org/presentationml/2006/ole">
             <mc:AlternateContent xmlns:mc="http://schemas.openxmlformats.org/markup-compatibility/2006">
               <mc:Choice xmlns:v="urn:schemas-microsoft-com:vml" Requires="v">
-                <p:oleObj spid="_x0000_s7215" name="Prism 10" r:id="rId5" imgW="7841604" imgH="3224536" progId="Prism10.Document">
+                <p:oleObj spid="_x0000_s7219" name="Prism 10" r:id="rId5" imgW="7841604" imgH="3224536" progId="Prism10.Document">
                   <p:embed/>
                 </p:oleObj>
               </mc:Choice>
@@ -5267,7 +5267,7 @@
           <a:graphicData uri="http://schemas.openxmlformats.org/presentationml/2006/ole">
             <mc:AlternateContent xmlns:mc="http://schemas.openxmlformats.org/markup-compatibility/2006">
               <mc:Choice xmlns:v="urn:schemas-microsoft-com:vml" Requires="v">
-                <p:oleObj spid="_x0000_s7216" name="Prism 10" r:id="rId7" imgW="6477737" imgH="3224536" progId="Prism10.Document">
+                <p:oleObj spid="_x0000_s7220" name="Prism 10" r:id="rId7" imgW="6477737" imgH="3224536" progId="Prism10.Document">
                   <p:embed/>
                 </p:oleObj>
               </mc:Choice>
@@ -5360,7 +5360,7 @@
           <a:graphicData uri="http://schemas.openxmlformats.org/presentationml/2006/ole">
             <mc:AlternateContent xmlns:mc="http://schemas.openxmlformats.org/markup-compatibility/2006">
               <mc:Choice xmlns:v="urn:schemas-microsoft-com:vml" Requires="v">
-                <p:oleObj spid="_x0000_s5149" name="Prism 10" r:id="rId4" imgW="7361425" imgH="3224536" progId="Prism10.Document">
+                <p:oleObj spid="_x0000_s5151" name="Prism 10" r:id="rId4" imgW="7361425" imgH="3224536" progId="Prism10.Document">
                   <p:embed/>
                 </p:oleObj>
               </mc:Choice>
@@ -5453,7 +5453,7 @@
           <a:graphicData uri="http://schemas.openxmlformats.org/presentationml/2006/ole">
             <mc:AlternateContent xmlns:mc="http://schemas.openxmlformats.org/markup-compatibility/2006">
               <mc:Choice xmlns:v="urn:schemas-microsoft-com:vml" Requires="v">
-                <p:oleObj spid="_x0000_s6172" name="Prism 10" r:id="rId4" imgW="7533843" imgH="3224536" progId="Prism10.Document">
+                <p:oleObj spid="_x0000_s6174" name="Prism 10" r:id="rId4" imgW="7533843" imgH="3224536" progId="Prism10.Document">
                   <p:embed/>
                 </p:oleObj>
               </mc:Choice>
@@ -5636,7 +5636,7 @@
           <a:graphicData uri="http://schemas.openxmlformats.org/presentationml/2006/ole">
             <mc:AlternateContent xmlns:mc="http://schemas.openxmlformats.org/markup-compatibility/2006">
               <mc:Choice xmlns:v="urn:schemas-microsoft-com:vml" Requires="v">
-                <p:oleObj spid="_x0000_s4126" name="Prism 10" r:id="rId4" imgW="8711614" imgH="3471470" progId="Prism10.Document">
+                <p:oleObj spid="_x0000_s4128" name="Prism 10" r:id="rId4" imgW="8711614" imgH="3471470" progId="Prism10.Document">
                   <p:embed/>
                 </p:oleObj>
               </mc:Choice>
@@ -5855,7 +5855,7 @@
           <a:graphicData uri="http://schemas.openxmlformats.org/presentationml/2006/ole">
             <mc:AlternateContent xmlns:mc="http://schemas.openxmlformats.org/markup-compatibility/2006">
               <mc:Choice xmlns:v="urn:schemas-microsoft-com:vml" Requires="v">
-                <p:oleObj spid="_x0000_s8236" name="Prism 10" r:id="rId5" imgW="6456500" imgH="3224536" progId="Prism10.Document">
+                <p:oleObj spid="_x0000_s8240" name="Prism 10" r:id="rId5" imgW="6456500" imgH="3224536" progId="Prism10.Document">
                   <p:embed/>
                 </p:oleObj>
               </mc:Choice>
@@ -5918,7 +5918,7 @@
           <a:graphicData uri="http://schemas.openxmlformats.org/presentationml/2006/ole">
             <mc:AlternateContent xmlns:mc="http://schemas.openxmlformats.org/markup-compatibility/2006">
               <mc:Choice xmlns:v="urn:schemas-microsoft-com:vml" Requires="v">
-                <p:oleObj spid="_x0000_s8237" name="Prism 10" r:id="rId7" imgW="6747343" imgH="3224536" progId="Prism10.Document">
+                <p:oleObj spid="_x0000_s8241" name="Prism 10" r:id="rId7" imgW="6747343" imgH="3224536" progId="Prism10.Document">
                   <p:embed/>
                 </p:oleObj>
               </mc:Choice>
@@ -6072,7 +6072,7 @@
         </p:blipFill>
         <p:spPr>
           <a:xfrm>
-            <a:off x="1443037" y="452437"/>
+            <a:off x="1443037" y="432559"/>
             <a:ext cx="9305925" cy="5953125"/>
           </a:xfrm>
           <a:prstGeom prst="rect">
@@ -6138,7 +6138,7 @@
           <a:graphicData uri="http://schemas.openxmlformats.org/presentationml/2006/ole">
             <mc:AlternateContent xmlns:mc="http://schemas.openxmlformats.org/markup-compatibility/2006">
               <mc:Choice xmlns:v="urn:schemas-microsoft-com:vml" Requires="v">
-                <p:oleObj spid="_x0000_s15373" name="Prism 10" r:id="rId3" imgW="2223078" imgH="3721283" progId="Prism10.Document">
+                <p:oleObj spid="_x0000_s15377" name="Prism 10" r:id="rId3" imgW="2223078" imgH="3721283" progId="Prism10.Document">
                   <p:embed/>
                 </p:oleObj>
               </mc:Choice>
@@ -6201,7 +6201,7 @@
           <a:graphicData uri="http://schemas.openxmlformats.org/presentationml/2006/ole">
             <mc:AlternateContent xmlns:mc="http://schemas.openxmlformats.org/markup-compatibility/2006">
               <mc:Choice xmlns:v="urn:schemas-microsoft-com:vml" Requires="v">
-                <p:oleObj spid="_x0000_s15374" name="Prism 10" r:id="rId5" imgW="2306947" imgH="3721283" progId="Prism10.Document">
+                <p:oleObj spid="_x0000_s15378" name="Prism 10" r:id="rId5" imgW="2306947" imgH="3721283" progId="Prism10.Document">
                   <p:embed/>
                 </p:oleObj>
               </mc:Choice>
@@ -6294,7 +6294,7 @@
           <a:graphicData uri="http://schemas.openxmlformats.org/presentationml/2006/ole">
             <mc:AlternateContent xmlns:mc="http://schemas.openxmlformats.org/markup-compatibility/2006">
               <mc:Choice xmlns:v="urn:schemas-microsoft-com:vml" Requires="v">
-                <p:oleObj spid="_x0000_s1114" name="Prism 10" r:id="rId4" imgW="2616508" imgH="3453112" progId="Prism10.Document">
+                <p:oleObj spid="_x0000_s1120" name="Prism 10" r:id="rId4" imgW="2616508" imgH="3453112" progId="Prism10.Document">
                   <p:embed/>
                 </p:oleObj>
               </mc:Choice>
@@ -6357,7 +6357,7 @@
           <a:graphicData uri="http://schemas.openxmlformats.org/presentationml/2006/ole">
             <mc:AlternateContent xmlns:mc="http://schemas.openxmlformats.org/markup-compatibility/2006">
               <mc:Choice xmlns:v="urn:schemas-microsoft-com:vml" Requires="v">
-                <p:oleObj spid="_x0000_s1115" name="Prism 10" r:id="rId6" imgW="3449802" imgH="3522944" progId="Prism10.Document">
+                <p:oleObj spid="_x0000_s1121" name="Prism 10" r:id="rId6" imgW="3449802" imgH="3522944" progId="Prism10.Document">
                   <p:embed/>
                 </p:oleObj>
               </mc:Choice>
@@ -6426,7 +6426,7 @@
           <a:graphicData uri="http://schemas.openxmlformats.org/presentationml/2006/ole">
             <mc:AlternateContent xmlns:mc="http://schemas.openxmlformats.org/markup-compatibility/2006">
               <mc:Choice xmlns:v="urn:schemas-microsoft-com:vml" Requires="v">
-                <p:oleObj spid="_x0000_s1116" name="Prism 10" r:id="rId8" imgW="2723054" imgH="3759439" progId="Prism10.Document">
+                <p:oleObj spid="_x0000_s1122" name="Prism 10" r:id="rId8" imgW="2723054" imgH="3759439" progId="Prism10.Document">
                   <p:embed/>
                 </p:oleObj>
               </mc:Choice>
@@ -6560,7 +6560,7 @@
           <a:graphicData uri="http://schemas.openxmlformats.org/presentationml/2006/ole">
             <mc:AlternateContent xmlns:mc="http://schemas.openxmlformats.org/markup-compatibility/2006">
               <mc:Choice xmlns:v="urn:schemas-microsoft-com:vml" Requires="v">
-                <p:oleObj spid="_x0000_s16408" name="Prism 10" r:id="rId3" imgW="3716528" imgH="3210858" progId="Prism10.Document">
+                <p:oleObj spid="_x0000_s16420" name="Prism 10" r:id="rId3" imgW="3716528" imgH="3210858" progId="Prism10.Document">
                   <p:embed/>
                 </p:oleObj>
               </mc:Choice>
@@ -6623,7 +6623,7 @@
           <a:graphicData uri="http://schemas.openxmlformats.org/presentationml/2006/ole">
             <mc:AlternateContent xmlns:mc="http://schemas.openxmlformats.org/markup-compatibility/2006">
               <mc:Choice xmlns:v="urn:schemas-microsoft-com:vml" Requires="v">
-                <p:oleObj spid="_x0000_s16409" name="Prism 10" r:id="rId5" imgW="3463480" imgH="3210858" progId="Prism10.Document">
+                <p:oleObj spid="_x0000_s16421" name="Prism 10" r:id="rId5" imgW="3463480" imgH="3210858" progId="Prism10.Document">
                   <p:embed/>
                 </p:oleObj>
               </mc:Choice>
@@ -6686,7 +6686,7 @@
           <a:graphicData uri="http://schemas.openxmlformats.org/presentationml/2006/ole">
             <mc:AlternateContent xmlns:mc="http://schemas.openxmlformats.org/markup-compatibility/2006">
               <mc:Choice xmlns:v="urn:schemas-microsoft-com:vml" Requires="v">
-                <p:oleObj spid="_x0000_s16410" name="Prism 10" r:id="rId7" imgW="3463480" imgH="3210858" progId="Prism10.Document">
+                <p:oleObj spid="_x0000_s16422" name="Prism 10" r:id="rId7" imgW="3463480" imgH="3210858" progId="Prism10.Document">
                   <p:embed/>
                 </p:oleObj>
               </mc:Choice>
@@ -6749,7 +6749,7 @@
           <a:graphicData uri="http://schemas.openxmlformats.org/presentationml/2006/ole">
             <mc:AlternateContent xmlns:mc="http://schemas.openxmlformats.org/markup-compatibility/2006">
               <mc:Choice xmlns:v="urn:schemas-microsoft-com:vml" Requires="v">
-                <p:oleObj spid="_x0000_s16411" name="Prism 10" r:id="rId9" imgW="3463480" imgH="3210858" progId="Prism10.Document">
+                <p:oleObj spid="_x0000_s16423" name="Prism 10" r:id="rId9" imgW="3463480" imgH="3210858" progId="Prism10.Document">
                   <p:embed/>
                 </p:oleObj>
               </mc:Choice>
@@ -6812,7 +6812,7 @@
           <a:graphicData uri="http://schemas.openxmlformats.org/presentationml/2006/ole">
             <mc:AlternateContent xmlns:mc="http://schemas.openxmlformats.org/markup-compatibility/2006">
               <mc:Choice xmlns:v="urn:schemas-microsoft-com:vml" Requires="v">
-                <p:oleObj spid="_x0000_s16412" name="Prism 10" r:id="rId11" imgW="3463480" imgH="3210858" progId="Prism10.Document">
+                <p:oleObj spid="_x0000_s16424" name="Prism 10" r:id="rId11" imgW="3463480" imgH="3210858" progId="Prism10.Document">
                   <p:embed/>
                 </p:oleObj>
               </mc:Choice>
@@ -6875,7 +6875,7 @@
           <a:graphicData uri="http://schemas.openxmlformats.org/presentationml/2006/ole">
             <mc:AlternateContent xmlns:mc="http://schemas.openxmlformats.org/markup-compatibility/2006">
               <mc:Choice xmlns:v="urn:schemas-microsoft-com:vml" Requires="v">
-                <p:oleObj spid="_x0000_s16413" name="Prism 10" r:id="rId13" imgW="5118550" imgH="3210858" progId="Prism10.Document">
+                <p:oleObj spid="_x0000_s16425" name="Prism 10" r:id="rId13" imgW="5118550" imgH="3210858" progId="Prism10.Document">
                   <p:embed/>
                 </p:oleObj>
               </mc:Choice>
@@ -7009,7 +7009,7 @@
           <a:graphicData uri="http://schemas.openxmlformats.org/presentationml/2006/ole">
             <mc:AlternateContent xmlns:mc="http://schemas.openxmlformats.org/markup-compatibility/2006">
               <mc:Choice xmlns:v="urn:schemas-microsoft-com:vml" Requires="v">
-                <p:oleObj spid="_x0000_s17422" name="Prism 10" r:id="rId3" imgW="4161431" imgH="3210858" progId="Prism10.Document">
+                <p:oleObj spid="_x0000_s17430" name="Prism 10" r:id="rId3" imgW="4161431" imgH="3210858" progId="Prism10.Document">
                   <p:embed/>
                 </p:oleObj>
               </mc:Choice>
@@ -7072,7 +7072,7 @@
           <a:graphicData uri="http://schemas.openxmlformats.org/presentationml/2006/ole">
             <mc:AlternateContent xmlns:mc="http://schemas.openxmlformats.org/markup-compatibility/2006">
               <mc:Choice xmlns:v="urn:schemas-microsoft-com:vml" Requires="v">
-                <p:oleObj spid="_x0000_s17423" name="Prism 10" r:id="rId5" imgW="3713648" imgH="3210858" progId="Prism10.Document">
+                <p:oleObj spid="_x0000_s17431" name="Prism 10" r:id="rId5" imgW="3713648" imgH="3210858" progId="Prism10.Document">
                   <p:embed/>
                 </p:oleObj>
               </mc:Choice>
@@ -7135,7 +7135,7 @@
           <a:graphicData uri="http://schemas.openxmlformats.org/presentationml/2006/ole">
             <mc:AlternateContent xmlns:mc="http://schemas.openxmlformats.org/markup-compatibility/2006">
               <mc:Choice xmlns:v="urn:schemas-microsoft-com:vml" Requires="v">
-                <p:oleObj spid="_x0000_s17424" name="Prism 10" r:id="rId7" imgW="3728766" imgH="3210858" progId="Prism10.Document">
+                <p:oleObj spid="_x0000_s17432" name="Prism 10" r:id="rId7" imgW="3728766" imgH="3210858" progId="Prism10.Document">
                   <p:embed/>
                 </p:oleObj>
               </mc:Choice>
@@ -7198,7 +7198,7 @@
           <a:graphicData uri="http://schemas.openxmlformats.org/presentationml/2006/ole">
             <mc:AlternateContent xmlns:mc="http://schemas.openxmlformats.org/markup-compatibility/2006">
               <mc:Choice xmlns:v="urn:schemas-microsoft-com:vml" Requires="v">
-                <p:oleObj spid="_x0000_s17425" name="Prism 10" r:id="rId9" imgW="3545910" imgH="3210858" progId="Prism10.Document">
+                <p:oleObj spid="_x0000_s17433" name="Prism 10" r:id="rId9" imgW="3545910" imgH="3210858" progId="Prism10.Document">
                   <p:embed/>
                 </p:oleObj>
               </mc:Choice>
@@ -7327,7 +7327,7 @@
           <a:graphicData uri="http://schemas.openxmlformats.org/presentationml/2006/ole">
             <mc:AlternateContent xmlns:mc="http://schemas.openxmlformats.org/markup-compatibility/2006">
               <mc:Choice xmlns:v="urn:schemas-microsoft-com:vml" Requires="v">
-                <p:oleObj spid="_x0000_s18438" name="Prism 10" r:id="rId3" imgW="3713648" imgH="3210858" progId="Prism10.Document">
+                <p:oleObj spid="_x0000_s18442" name="Prism 10" r:id="rId3" imgW="3713648" imgH="3210858" progId="Prism10.Document">
                   <p:embed/>
                 </p:oleObj>
               </mc:Choice>
@@ -7390,7 +7390,7 @@
           <a:graphicData uri="http://schemas.openxmlformats.org/presentationml/2006/ole">
             <mc:AlternateContent xmlns:mc="http://schemas.openxmlformats.org/markup-compatibility/2006">
               <mc:Choice xmlns:v="urn:schemas-microsoft-com:vml" Requires="v">
-                <p:oleObj spid="_x0000_s18439" name="Prism 10" r:id="rId5" imgW="3622220" imgH="3210858" progId="Prism10.Document">
+                <p:oleObj spid="_x0000_s18443" name="Prism 10" r:id="rId5" imgW="3622220" imgH="3210858" progId="Prism10.Document">
                   <p:embed/>
                 </p:oleObj>
               </mc:Choice>
@@ -7513,7 +7513,7 @@
           <a:graphicData uri="http://schemas.openxmlformats.org/presentationml/2006/ole">
             <mc:AlternateContent xmlns:mc="http://schemas.openxmlformats.org/markup-compatibility/2006">
               <mc:Choice xmlns:v="urn:schemas-microsoft-com:vml" Requires="v">
-                <p:oleObj spid="_x0000_s14350" name="Prism 10" r:id="rId5" imgW="2401615" imgH="3651091" progId="Prism10.Document">
+                <p:oleObj spid="_x0000_s14352" name="Prism 10" r:id="rId5" imgW="2401615" imgH="3651091" progId="Prism10.Document">
                   <p:embed/>
                 </p:oleObj>
               </mc:Choice>
@@ -7612,7 +7612,7 @@
           <a:graphicData uri="http://schemas.openxmlformats.org/presentationml/2006/ole">
             <mc:AlternateContent xmlns:mc="http://schemas.openxmlformats.org/markup-compatibility/2006">
               <mc:Choice xmlns:v="urn:schemas-microsoft-com:vml" Requires="v">
-                <p:oleObj spid="_x0000_s13349" name="Prism 10" r:id="rId3" imgW="2425732" imgH="3507826" progId="Prism10.Document">
+                <p:oleObj spid="_x0000_s13355" name="Prism 10" r:id="rId3" imgW="2425732" imgH="3507826" progId="Prism10.Document">
                   <p:embed/>
                 </p:oleObj>
               </mc:Choice>
@@ -7675,7 +7675,7 @@
           <a:graphicData uri="http://schemas.openxmlformats.org/presentationml/2006/ole">
             <mc:AlternateContent xmlns:mc="http://schemas.openxmlformats.org/markup-compatibility/2006">
               <mc:Choice xmlns:v="urn:schemas-microsoft-com:vml" Requires="v">
-                <p:oleObj spid="_x0000_s13350" name="Prism 10" r:id="rId5" imgW="2540197" imgH="3507826" progId="Prism10.Document">
+                <p:oleObj spid="_x0000_s13356" name="Prism 10" r:id="rId5" imgW="2540197" imgH="3507826" progId="Prism10.Document">
                   <p:embed/>
                 </p:oleObj>
               </mc:Choice>
@@ -7738,7 +7738,7 @@
           <a:graphicData uri="http://schemas.openxmlformats.org/presentationml/2006/ole">
             <mc:AlternateContent xmlns:mc="http://schemas.openxmlformats.org/markup-compatibility/2006">
               <mc:Choice xmlns:v="urn:schemas-microsoft-com:vml" Requires="v">
-                <p:oleObj spid="_x0000_s13351" name="Prism 10" r:id="rId7" imgW="2616508" imgH="3507826" progId="Prism10.Document">
+                <p:oleObj spid="_x0000_s13357" name="Prism 10" r:id="rId7" imgW="2616508" imgH="3507826" progId="Prism10.Document">
                   <p:embed/>
                 </p:oleObj>
               </mc:Choice>
@@ -7928,7 +7928,7 @@
           <a:graphicData uri="http://schemas.openxmlformats.org/presentationml/2006/ole">
             <mc:AlternateContent xmlns:mc="http://schemas.openxmlformats.org/markup-compatibility/2006">
               <mc:Choice xmlns:v="urn:schemas-microsoft-com:vml" Requires="v">
-                <p:oleObj spid="_x0000_s11299" name="Prism 10" r:id="rId5" imgW="6515892" imgH="3224536" progId="Prism10.Document">
+                <p:oleObj spid="_x0000_s11303" name="Prism 10" r:id="rId5" imgW="6515892" imgH="3224536" progId="Prism10.Document">
                   <p:embed/>
                 </p:oleObj>
               </mc:Choice>
@@ -7991,7 +7991,7 @@
           <a:graphicData uri="http://schemas.openxmlformats.org/presentationml/2006/ole">
             <mc:AlternateContent xmlns:mc="http://schemas.openxmlformats.org/markup-compatibility/2006">
               <mc:Choice xmlns:v="urn:schemas-microsoft-com:vml" Requires="v">
-                <p:oleObj spid="_x0000_s11300" name="Prism 10" r:id="rId7" imgW="6681831" imgH="3224536" progId="Prism10.Document">
+                <p:oleObj spid="_x0000_s11304" name="Prism 10" r:id="rId7" imgW="6681831" imgH="3224536" progId="Prism10.Document">
                   <p:embed/>
                 </p:oleObj>
               </mc:Choice>
@@ -8084,7 +8084,7 @@
           <a:graphicData uri="http://schemas.openxmlformats.org/presentationml/2006/ole">
             <mc:AlternateContent xmlns:mc="http://schemas.openxmlformats.org/markup-compatibility/2006">
               <mc:Choice xmlns:v="urn:schemas-microsoft-com:vml" Requires="v">
-                <p:oleObj spid="_x0000_s12306" name="Prism 10" r:id="rId4" imgW="6383069" imgH="3224536" progId="Prism10.Document">
+                <p:oleObj spid="_x0000_s12308" name="Prism 10" r:id="rId4" imgW="6383069" imgH="3224536" progId="Prism10.Document">
                   <p:embed/>
                 </p:oleObj>
               </mc:Choice>
@@ -8440,7 +8440,7 @@
           <a:graphicData uri="http://schemas.openxmlformats.org/presentationml/2006/ole">
             <mc:AlternateContent xmlns:mc="http://schemas.openxmlformats.org/markup-compatibility/2006">
               <mc:Choice xmlns:v="urn:schemas-microsoft-com:vml" Requires="v">
-                <p:oleObj spid="_x0000_s19460" name="Prism 10" r:id="rId4" imgW="6515892" imgH="2942686" progId="Prism10.Document">
+                <p:oleObj spid="_x0000_s19464" name="Prism 10" r:id="rId4" imgW="6515892" imgH="2942686" progId="Prism10.Document">
                   <p:embed/>
                 </p:oleObj>
               </mc:Choice>
@@ -8503,7 +8503,7 @@
           <a:graphicData uri="http://schemas.openxmlformats.org/presentationml/2006/ole">
             <mc:AlternateContent xmlns:mc="http://schemas.openxmlformats.org/markup-compatibility/2006">
               <mc:Choice xmlns:v="urn:schemas-microsoft-com:vml" Requires="v">
-                <p:oleObj spid="_x0000_s19461" name="Prism 10" r:id="rId6" imgW="6681831" imgH="2942686" progId="Prism10.Document">
+                <p:oleObj spid="_x0000_s19465" name="Prism 10" r:id="rId6" imgW="6681831" imgH="2942686" progId="Prism10.Document">
                   <p:embed/>
                 </p:oleObj>
               </mc:Choice>
@@ -8748,7 +8748,7 @@
           <a:graphicData uri="http://schemas.openxmlformats.org/presentationml/2006/ole">
             <mc:AlternateContent xmlns:mc="http://schemas.openxmlformats.org/markup-compatibility/2006">
               <mc:Choice xmlns:v="urn:schemas-microsoft-com:vml" Requires="v">
-                <p:oleObj spid="_x0000_s10262" name="Prism 10" r:id="rId6" imgW="7841604" imgH="3224536" progId="Prism10.Document">
+                <p:oleObj spid="_x0000_s10264" name="Prism 10" r:id="rId6" imgW="7841604" imgH="3224536" progId="Prism10.Document">
                   <p:embed/>
                 </p:oleObj>
               </mc:Choice>

</xml_diff>